<commit_message>
vault backup: 2025-11-17 11:50:19
</commit_message>
<xml_diff>
--- a/sla_presentation/SLA.pptx
+++ b/sla_presentation/SLA.pptx
@@ -137,14 +137,6 @@
 </p:presentation>
 </file>
 
-<file path=ppt/revisionInfo.xml><?xml version="1.0" encoding="utf-8"?>
-<p1510:revInfo xmlns:a="http://schemas.openxmlformats.org/drawingml/2006/main" xmlns:r="http://schemas.openxmlformats.org/officeDocument/2006/relationships" xmlns:p1510="http://schemas.microsoft.com/office/powerpoint/2015/10/main">
-  <p1510:revLst>
-    <p1510:client id="{B48193FC-8019-445D-B4DA-7FC3E21A9F5E}" v="993" dt="2025-11-10T10:26:14.840"/>
-  </p1510:revLst>
-</p1510:revInfo>
-</file>
-
 <file path=ppt/slideLayouts/slideLayout1.xml><?xml version="1.0" encoding="utf-8"?>
 <p:sldLayout xmlns:a="http://schemas.openxmlformats.org/drawingml/2006/main" xmlns:r="http://schemas.openxmlformats.org/officeDocument/2006/relationships" xmlns:p="http://schemas.openxmlformats.org/presentationml/2006/main" showMasterSp="0" type="title" preserve="1">
   <p:cSld name="Title Slide">
@@ -923,7 +915,7 @@
           <a:p>
             <a:fld id="{76CAB6A4-4888-406E-8DDF-D06D94A2CC5F}" type="datetimeFigureOut">
               <a:rPr lang="de-DE" smtClean="0"/>
-              <a:t>10.11.2025</a:t>
+              <a:t>13.11.2025</a:t>
             </a:fld>
             <a:endParaRPr lang="de-DE"/>
           </a:p>
@@ -1174,7 +1166,7 @@
           <a:p>
             <a:fld id="{76CAB6A4-4888-406E-8DDF-D06D94A2CC5F}" type="datetimeFigureOut">
               <a:rPr lang="de-DE" smtClean="0"/>
-              <a:t>10.11.2025</a:t>
+              <a:t>13.11.2025</a:t>
             </a:fld>
             <a:endParaRPr lang="de-DE"/>
           </a:p>
@@ -1488,7 +1480,7 @@
           <a:p>
             <a:fld id="{76CAB6A4-4888-406E-8DDF-D06D94A2CC5F}" type="datetimeFigureOut">
               <a:rPr lang="de-DE" smtClean="0"/>
-              <a:t>10.11.2025</a:t>
+              <a:t>13.11.2025</a:t>
             </a:fld>
             <a:endParaRPr lang="de-DE"/>
           </a:p>
@@ -1829,7 +1821,7 @@
           <a:p>
             <a:fld id="{76CAB6A4-4888-406E-8DDF-D06D94A2CC5F}" type="datetimeFigureOut">
               <a:rPr lang="de-DE" smtClean="0"/>
-              <a:t>10.11.2025</a:t>
+              <a:t>13.11.2025</a:t>
             </a:fld>
             <a:endParaRPr lang="de-DE"/>
           </a:p>
@@ -2143,7 +2135,7 @@
           <a:p>
             <a:fld id="{76CAB6A4-4888-406E-8DDF-D06D94A2CC5F}" type="datetimeFigureOut">
               <a:rPr lang="de-DE" smtClean="0"/>
-              <a:t>10.11.2025</a:t>
+              <a:t>13.11.2025</a:t>
             </a:fld>
             <a:endParaRPr lang="de-DE"/>
           </a:p>
@@ -2536,7 +2528,7 @@
           <a:p>
             <a:fld id="{76CAB6A4-4888-406E-8DDF-D06D94A2CC5F}" type="datetimeFigureOut">
               <a:rPr lang="de-DE" smtClean="0"/>
-              <a:t>10.11.2025</a:t>
+              <a:t>13.11.2025</a:t>
             </a:fld>
             <a:endParaRPr lang="de-DE"/>
           </a:p>
@@ -2706,7 +2698,7 @@
           <a:p>
             <a:fld id="{76CAB6A4-4888-406E-8DDF-D06D94A2CC5F}" type="datetimeFigureOut">
               <a:rPr lang="de-DE" smtClean="0"/>
-              <a:t>10.11.2025</a:t>
+              <a:t>13.11.2025</a:t>
             </a:fld>
             <a:endParaRPr lang="de-DE"/>
           </a:p>
@@ -2886,7 +2878,7 @@
           <a:p>
             <a:fld id="{76CAB6A4-4888-406E-8DDF-D06D94A2CC5F}" type="datetimeFigureOut">
               <a:rPr lang="de-DE" smtClean="0"/>
-              <a:t>10.11.2025</a:t>
+              <a:t>13.11.2025</a:t>
             </a:fld>
             <a:endParaRPr lang="de-DE"/>
           </a:p>
@@ -3062,7 +3054,7 @@
           <a:p>
             <a:fld id="{76CAB6A4-4888-406E-8DDF-D06D94A2CC5F}" type="datetimeFigureOut">
               <a:rPr lang="de-DE" smtClean="0"/>
-              <a:t>10.11.2025</a:t>
+              <a:t>13.11.2025</a:t>
             </a:fld>
             <a:endParaRPr lang="de-DE"/>
           </a:p>
@@ -3309,7 +3301,7 @@
           <a:p>
             <a:fld id="{76CAB6A4-4888-406E-8DDF-D06D94A2CC5F}" type="datetimeFigureOut">
               <a:rPr lang="de-DE" smtClean="0"/>
-              <a:t>10.11.2025</a:t>
+              <a:t>13.11.2025</a:t>
             </a:fld>
             <a:endParaRPr lang="de-DE"/>
           </a:p>
@@ -3541,7 +3533,7 @@
           <a:p>
             <a:fld id="{76CAB6A4-4888-406E-8DDF-D06D94A2CC5F}" type="datetimeFigureOut">
               <a:rPr lang="de-DE" smtClean="0"/>
-              <a:t>10.11.2025</a:t>
+              <a:t>13.11.2025</a:t>
             </a:fld>
             <a:endParaRPr lang="de-DE"/>
           </a:p>
@@ -3915,7 +3907,7 @@
           <a:p>
             <a:fld id="{76CAB6A4-4888-406E-8DDF-D06D94A2CC5F}" type="datetimeFigureOut">
               <a:rPr lang="de-DE" smtClean="0"/>
-              <a:t>10.11.2025</a:t>
+              <a:t>13.11.2025</a:t>
             </a:fld>
             <a:endParaRPr lang="de-DE"/>
           </a:p>
@@ -4038,7 +4030,7 @@
           <a:p>
             <a:fld id="{76CAB6A4-4888-406E-8DDF-D06D94A2CC5F}" type="datetimeFigureOut">
               <a:rPr lang="de-DE" smtClean="0"/>
-              <a:t>10.11.2025</a:t>
+              <a:t>13.11.2025</a:t>
             </a:fld>
             <a:endParaRPr lang="de-DE"/>
           </a:p>
@@ -4133,7 +4125,7 @@
           <a:p>
             <a:fld id="{76CAB6A4-4888-406E-8DDF-D06D94A2CC5F}" type="datetimeFigureOut">
               <a:rPr lang="de-DE" smtClean="0"/>
-              <a:t>10.11.2025</a:t>
+              <a:t>13.11.2025</a:t>
             </a:fld>
             <a:endParaRPr lang="de-DE"/>
           </a:p>
@@ -4388,7 +4380,7 @@
           <a:p>
             <a:fld id="{76CAB6A4-4888-406E-8DDF-D06D94A2CC5F}" type="datetimeFigureOut">
               <a:rPr lang="de-DE" smtClean="0"/>
-              <a:t>10.11.2025</a:t>
+              <a:t>13.11.2025</a:t>
             </a:fld>
             <a:endParaRPr lang="de-DE"/>
           </a:p>
@@ -4651,7 +4643,7 @@
           <a:p>
             <a:fld id="{76CAB6A4-4888-406E-8DDF-D06D94A2CC5F}" type="datetimeFigureOut">
               <a:rPr lang="de-DE" smtClean="0"/>
-              <a:t>10.11.2025</a:t>
+              <a:t>13.11.2025</a:t>
             </a:fld>
             <a:endParaRPr lang="de-DE"/>
           </a:p>
@@ -5450,7 +5442,7 @@
           <a:p>
             <a:fld id="{76CAB6A4-4888-406E-8DDF-D06D94A2CC5F}" type="datetimeFigureOut">
               <a:rPr lang="de-DE" smtClean="0"/>
-              <a:t>10.11.2025</a:t>
+              <a:t>13.11.2025</a:t>
             </a:fld>
             <a:endParaRPr lang="de-DE"/>
           </a:p>
@@ -23003,17 +22995,6 @@
               <a:t>https://azure.microsoft.com/de-de/support/plans/response</a:t>
             </a:r>
             <a:endParaRPr lang="de-DE" sz="1700" dirty="0"/>
-          </a:p>
-          <a:p>
-            <a:pPr>
-              <a:lnSpc>
-                <a:spcPct val="90000"/>
-              </a:lnSpc>
-            </a:pPr>
-            <a:r>
-              <a:rPr lang="de-DE" sz="1700" dirty="0"/>
-              <a:t>…</a:t>
-            </a:r>
           </a:p>
           <a:p>
             <a:pPr>
@@ -28531,7 +28512,23 @@
                   <a:schemeClr val="bg1"/>
                 </a:solidFill>
               </a:rPr>
-              <a:t> lang das System </a:t>
+              <a:t> </a:t>
+            </a:r>
+            <a:r>
+              <a:rPr lang="en-US" dirty="0" err="1">
+                <a:solidFill>
+                  <a:schemeClr val="bg1"/>
+                </a:solidFill>
+              </a:rPr>
+              <a:t>lange</a:t>
+            </a:r>
+            <a:r>
+              <a:rPr lang="en-US" dirty="0">
+                <a:solidFill>
+                  <a:schemeClr val="bg1"/>
+                </a:solidFill>
+              </a:rPr>
+              <a:t> das System </a:t>
             </a:r>
             <a:r>
               <a:rPr lang="en-US" dirty="0" err="1">

</xml_diff>